<commit_message>
add kelp forest label to supp plot
</commit_message>
<xml_diff>
--- a/Output/Pub_figs/ppt_shame_folder/Supp1_Fig1.pptx
+++ b/Output/Pub_figs/ppt_shame_folder/Supp1_Fig1.pptx
@@ -203,7 +203,7 @@
           <a:p>
             <a:fld id="{8C547A30-B33E-0F4D-80D3-447684F1AE93}" type="datetimeFigureOut">
               <a:rPr lang="en-US" smtClean="0"/>
-              <a:t>10/1/24</a:t>
+              <a:t>11/12/24</a:t>
             </a:fld>
             <a:endParaRPr lang="en-US"/>
           </a:p>
@@ -1457,7 +1457,7 @@
           <a:p>
             <a:fld id="{920285A9-D9B7-E64A-891F-D75C53CC6425}" type="datetimeFigureOut">
               <a:rPr lang="en-US" smtClean="0"/>
-              <a:t>10/1/24</a:t>
+              <a:t>11/12/24</a:t>
             </a:fld>
             <a:endParaRPr lang="en-US"/>
           </a:p>
@@ -1627,7 +1627,7 @@
           <a:p>
             <a:fld id="{920285A9-D9B7-E64A-891F-D75C53CC6425}" type="datetimeFigureOut">
               <a:rPr lang="en-US" smtClean="0"/>
-              <a:t>10/1/24</a:t>
+              <a:t>11/12/24</a:t>
             </a:fld>
             <a:endParaRPr lang="en-US"/>
           </a:p>
@@ -1807,7 +1807,7 @@
           <a:p>
             <a:fld id="{920285A9-D9B7-E64A-891F-D75C53CC6425}" type="datetimeFigureOut">
               <a:rPr lang="en-US" smtClean="0"/>
-              <a:t>10/1/24</a:t>
+              <a:t>11/12/24</a:t>
             </a:fld>
             <a:endParaRPr lang="en-US"/>
           </a:p>
@@ -1977,7 +1977,7 @@
           <a:p>
             <a:fld id="{920285A9-D9B7-E64A-891F-D75C53CC6425}" type="datetimeFigureOut">
               <a:rPr lang="en-US" smtClean="0"/>
-              <a:t>10/1/24</a:t>
+              <a:t>11/12/24</a:t>
             </a:fld>
             <a:endParaRPr lang="en-US"/>
           </a:p>
@@ -2223,7 +2223,7 @@
           <a:p>
             <a:fld id="{920285A9-D9B7-E64A-891F-D75C53CC6425}" type="datetimeFigureOut">
               <a:rPr lang="en-US" smtClean="0"/>
-              <a:t>10/1/24</a:t>
+              <a:t>11/12/24</a:t>
             </a:fld>
             <a:endParaRPr lang="en-US"/>
           </a:p>
@@ -2455,7 +2455,7 @@
           <a:p>
             <a:fld id="{920285A9-D9B7-E64A-891F-D75C53CC6425}" type="datetimeFigureOut">
               <a:rPr lang="en-US" smtClean="0"/>
-              <a:t>10/1/24</a:t>
+              <a:t>11/12/24</a:t>
             </a:fld>
             <a:endParaRPr lang="en-US"/>
           </a:p>
@@ -2822,7 +2822,7 @@
           <a:p>
             <a:fld id="{920285A9-D9B7-E64A-891F-D75C53CC6425}" type="datetimeFigureOut">
               <a:rPr lang="en-US" smtClean="0"/>
-              <a:t>10/1/24</a:t>
+              <a:t>11/12/24</a:t>
             </a:fld>
             <a:endParaRPr lang="en-US"/>
           </a:p>
@@ -2940,7 +2940,7 @@
           <a:p>
             <a:fld id="{920285A9-D9B7-E64A-891F-D75C53CC6425}" type="datetimeFigureOut">
               <a:rPr lang="en-US" smtClean="0"/>
-              <a:t>10/1/24</a:t>
+              <a:t>11/12/24</a:t>
             </a:fld>
             <a:endParaRPr lang="en-US"/>
           </a:p>
@@ -3035,7 +3035,7 @@
           <a:p>
             <a:fld id="{920285A9-D9B7-E64A-891F-D75C53CC6425}" type="datetimeFigureOut">
               <a:rPr lang="en-US" smtClean="0"/>
-              <a:t>10/1/24</a:t>
+              <a:t>11/12/24</a:t>
             </a:fld>
             <a:endParaRPr lang="en-US"/>
           </a:p>
@@ -3312,7 +3312,7 @@
           <a:p>
             <a:fld id="{920285A9-D9B7-E64A-891F-D75C53CC6425}" type="datetimeFigureOut">
               <a:rPr lang="en-US" smtClean="0"/>
-              <a:t>10/1/24</a:t>
+              <a:t>11/12/24</a:t>
             </a:fld>
             <a:endParaRPr lang="en-US"/>
           </a:p>
@@ -3569,7 +3569,7 @@
           <a:p>
             <a:fld id="{920285A9-D9B7-E64A-891F-D75C53CC6425}" type="datetimeFigureOut">
               <a:rPr lang="en-US" smtClean="0"/>
-              <a:t>10/1/24</a:t>
+              <a:t>11/12/24</a:t>
             </a:fld>
             <a:endParaRPr lang="en-US"/>
           </a:p>
@@ -3782,7 +3782,7 @@
           <a:p>
             <a:fld id="{920285A9-D9B7-E64A-891F-D75C53CC6425}" type="datetimeFigureOut">
               <a:rPr lang="en-US" smtClean="0"/>
-              <a:t>10/1/24</a:t>
+              <a:t>11/12/24</a:t>
             </a:fld>
             <a:endParaRPr lang="en-US"/>
           </a:p>
@@ -5016,6 +5016,44 @@
           </p:sp>
         </p:grpSp>
       </p:grpSp>
+      <p:sp>
+        <p:nvSpPr>
+          <p:cNvPr id="3" name="TextBox 2">
+            <a:extLst>
+              <a:ext uri="{FF2B5EF4-FFF2-40B4-BE49-F238E27FC236}">
+                <a16:creationId xmlns:a16="http://schemas.microsoft.com/office/drawing/2014/main" id="{51AAE824-ACB7-6864-EBAF-500AF4793C22}"/>
+              </a:ext>
+            </a:extLst>
+          </p:cNvPr>
+          <p:cNvSpPr txBox="1"/>
+          <p:nvPr/>
+        </p:nvSpPr>
+        <p:spPr>
+          <a:xfrm>
+            <a:off x="1849020" y="619872"/>
+            <a:ext cx="873957" cy="276999"/>
+          </a:xfrm>
+          <a:prstGeom prst="rect">
+            <a:avLst/>
+          </a:prstGeom>
+          <a:noFill/>
+        </p:spPr>
+        <p:txBody>
+          <a:bodyPr wrap="none" rtlCol="0">
+            <a:spAutoFit/>
+          </a:bodyPr>
+          <a:lstStyle/>
+          <a:p>
+            <a:r>
+              <a:rPr lang="en-US" sz="1200" dirty="0">
+                <a:latin typeface="Times New Roman" panose="02020603050405020304" pitchFamily="18" charset="0"/>
+                <a:cs typeface="Times New Roman" panose="02020603050405020304" pitchFamily="18" charset="0"/>
+              </a:rPr>
+              <a:t>Kelp forest</a:t>
+            </a:r>
+          </a:p>
+        </p:txBody>
+      </p:sp>
     </p:spTree>
     <p:extLst>
       <p:ext uri="{BB962C8B-B14F-4D97-AF65-F5344CB8AC3E}">

</xml_diff>